<commit_message>
Completed 100% Presentation and Docs
</commit_message>
<xml_diff>
--- a/100%/100% Presentation.pptx
+++ b/100%/100% Presentation.pptx
@@ -9996,21 +9996,21 @@
                 <a:latin typeface="Times New Roman" panose="02020603050405020304" pitchFamily="18" charset="0"/>
                 <a:cs typeface="Times New Roman" panose="02020603050405020304" pitchFamily="18" charset="0"/>
               </a:rPr>
-              <a:t>Details of 2</a:t>
+              <a:t>Details of 3</a:t>
             </a:r>
             <a:r>
               <a:rPr lang="en-US" b="1" baseline="30000" dirty="0">
                 <a:latin typeface="Times New Roman" panose="02020603050405020304" pitchFamily="18" charset="0"/>
                 <a:cs typeface="Times New Roman" panose="02020603050405020304" pitchFamily="18" charset="0"/>
               </a:rPr>
-              <a:t>nd</a:t>
+              <a:t>rd</a:t>
             </a:r>
             <a:r>
               <a:rPr lang="en-US" b="1" dirty="0">
                 <a:latin typeface="Times New Roman" panose="02020603050405020304" pitchFamily="18" charset="0"/>
                 <a:cs typeface="Times New Roman" panose="02020603050405020304" pitchFamily="18" charset="0"/>
               </a:rPr>
-              <a:t> Iteration (60%)</a:t>
+              <a:t> Iteration (100%)</a:t>
             </a:r>
           </a:p>
         </p:txBody>
@@ -10052,7 +10052,7 @@
                 <a:latin typeface="Times New Roman" panose="02020603050405020304" pitchFamily="18" charset="0"/>
                 <a:cs typeface="Times New Roman" panose="02020603050405020304" pitchFamily="18" charset="0"/>
               </a:rPr>
-              <a:t>Enhanced Cart and Checkout System.</a:t>
+              <a:t>Complete Admin Panel.</a:t>
             </a:r>
           </a:p>
           <a:p>
@@ -10071,8 +10071,31 @@
                 <a:latin typeface="Times New Roman" panose="02020603050405020304" pitchFamily="18" charset="0"/>
                 <a:cs typeface="Times New Roman" panose="02020603050405020304" pitchFamily="18" charset="0"/>
               </a:rPr>
-              <a:t>View 3D model on website.</a:t>
-            </a:r>
+              <a:t>Designed Advanced 3D furniture models of </a:t>
+            </a:r>
+            <a:r>
+              <a:rPr lang="en-US" sz="2400">
+                <a:solidFill>
+                  <a:schemeClr val="tx1">
+                    <a:lumMod val="95000"/>
+                    <a:lumOff val="5000"/>
+                  </a:schemeClr>
+                </a:solidFill>
+                <a:latin typeface="Times New Roman" panose="02020603050405020304" pitchFamily="18" charset="0"/>
+                <a:cs typeface="Times New Roman" panose="02020603050405020304" pitchFamily="18" charset="0"/>
+              </a:rPr>
+              <a:t>other categories.</a:t>
+            </a:r>
+            <a:endParaRPr lang="en-US" sz="2400" dirty="0">
+              <a:solidFill>
+                <a:schemeClr val="tx1">
+                  <a:lumMod val="95000"/>
+                  <a:lumOff val="5000"/>
+                </a:schemeClr>
+              </a:solidFill>
+              <a:latin typeface="Times New Roman" panose="02020603050405020304" pitchFamily="18" charset="0"/>
+              <a:cs typeface="Times New Roman" panose="02020603050405020304" pitchFamily="18" charset="0"/>
+            </a:endParaRPr>
           </a:p>
           <a:p>
             <a:pPr marL="457200" indent="-457200">
@@ -10090,7 +10113,7 @@
                 <a:latin typeface="Times New Roman" panose="02020603050405020304" pitchFamily="18" charset="0"/>
                 <a:cs typeface="Times New Roman" panose="02020603050405020304" pitchFamily="18" charset="0"/>
               </a:rPr>
-              <a:t>Implement backend functionality for dynamic loading of 3D models.</a:t>
+              <a:t>Adjusted previous models measurement.</a:t>
             </a:r>
           </a:p>
           <a:p>
@@ -10109,7 +10132,7 @@
                 <a:latin typeface="Times New Roman" panose="02020603050405020304" pitchFamily="18" charset="0"/>
                 <a:cs typeface="Times New Roman" panose="02020603050405020304" pitchFamily="18" charset="0"/>
               </a:rPr>
-              <a:t>Enable real-time augmentation of furniture models using scripting.</a:t>
+              <a:t>Improved accuracy of AR.</a:t>
             </a:r>
           </a:p>
           <a:p>
@@ -10128,7 +10151,26 @@
                 <a:latin typeface="Times New Roman" panose="02020603050405020304" pitchFamily="18" charset="0"/>
                 <a:cs typeface="Times New Roman" panose="02020603050405020304" pitchFamily="18" charset="0"/>
               </a:rPr>
-              <a:t>Design 3D models of other categories Furniture Items.</a:t>
+              <a:t>Enable real-time augmentation of furniture models using scripting.</a:t>
+            </a:r>
+          </a:p>
+          <a:p>
+            <a:pPr marL="457200" indent="-457200">
+              <a:buFont typeface="+mj-lt"/>
+              <a:buAutoNum type="arabicPeriod"/>
+            </a:pPr>
+            <a:r>
+              <a:rPr lang="en-US" sz="2400" dirty="0">
+                <a:solidFill>
+                  <a:schemeClr val="tx1">
+                    <a:lumMod val="95000"/>
+                    <a:lumOff val="5000"/>
+                  </a:schemeClr>
+                </a:solidFill>
+                <a:latin typeface="Times New Roman" panose="02020603050405020304" pitchFamily="18" charset="0"/>
+                <a:cs typeface="Times New Roman" panose="02020603050405020304" pitchFamily="18" charset="0"/>
+              </a:rPr>
+              <a:t>Deployed Website.</a:t>
             </a:r>
           </a:p>
         </p:txBody>
@@ -11120,15 +11162,6 @@
                 <a:cs typeface="Times New Roman" panose="02020603050405020304" pitchFamily="18" charset="0"/>
               </a:rPr>
               <a:t>Gant Chart</a:t>
-            </a:r>
-          </a:p>
-          <a:p>
-            <a:r>
-              <a:rPr lang="en-US" b="1" dirty="0">
-                <a:latin typeface="Times New Roman" panose="02020603050405020304" pitchFamily="18" charset="0"/>
-                <a:cs typeface="Times New Roman" panose="02020603050405020304" pitchFamily="18" charset="0"/>
-              </a:rPr>
-              <a:t>Details of 1st Iteration (30%)</a:t>
             </a:r>
           </a:p>
           <a:p>

</xml_diff>